<commit_message>
Applied Data Science Capstone Final Presentation
Applied Data Science Capstone Final Presentation
</commit_message>
<xml_diff>
--- a/Location-Based Personalized Advertisements.pptx
+++ b/Location-Based Personalized Advertisements.pptx
@@ -276,6 +276,11 @@
       </a:defRPr>
     </a:lvl9pPr>
   </p:defaultTextStyle>
+  <p:extLst>
+    <p:ext uri="{EFAFB233-063F-42B5-8137-9DF3F51BA10A}">
+      <p15:sldGuideLst xmlns:p15="http://schemas.microsoft.com/office/powerpoint/2012/main"/>
+    </p:ext>
+  </p:extLst>
 </p:presentation>
 </file>
 
@@ -19540,6 +19545,16 @@
               <a:t>(Los Angeles)</a:t>
             </a:r>
             <a:br>
+              <a:rPr lang="en-US" sz="2400" dirty="0"/>
+            </a:br>
+            <a:br>
+              <a:rPr lang="en-US" sz="2400" dirty="0"/>
+            </a:br>
+            <a:r>
+              <a:rPr lang="en-US" sz="2400" dirty="0"/>
+              <a:t>              Jiewei Gao</a:t>
+            </a:r>
+            <a:br>
               <a:rPr lang="en-US" dirty="0"/>
             </a:br>
             <a:br>

</xml_diff>